<commit_message>
Examples on kurtosis and skewness
</commit_message>
<xml_diff>
--- a/Project.pptx
+++ b/Project.pptx
@@ -8,13 +8,14 @@
     <p:sldId id="292" r:id="rId5"/>
     <p:sldId id="309" r:id="rId6"/>
     <p:sldId id="310" r:id="rId7"/>
-    <p:sldId id="311" r:id="rId8"/>
-    <p:sldId id="312" r:id="rId9"/>
-    <p:sldId id="313" r:id="rId10"/>
-    <p:sldId id="314" r:id="rId11"/>
-    <p:sldId id="315" r:id="rId12"/>
-    <p:sldId id="316" r:id="rId13"/>
-    <p:sldId id="317" r:id="rId14"/>
+    <p:sldId id="318" r:id="rId8"/>
+    <p:sldId id="311" r:id="rId9"/>
+    <p:sldId id="312" r:id="rId10"/>
+    <p:sldId id="313" r:id="rId11"/>
+    <p:sldId id="314" r:id="rId12"/>
+    <p:sldId id="315" r:id="rId13"/>
+    <p:sldId id="316" r:id="rId14"/>
+    <p:sldId id="317" r:id="rId15"/>
   </p:sldIdLst>
   <p:sldSz cx="12192000" cy="6858000"/>
   <p:notesSz cx="6858000" cy="9144000"/>
@@ -7133,6 +7134,142 @@
           <p:cNvPr id="2" name="Title 1">
             <a:extLst>
               <a:ext uri="{FF2B5EF4-FFF2-40B4-BE49-F238E27FC236}">
+                <a16:creationId xmlns:a16="http://schemas.microsoft.com/office/drawing/2014/main" id="{CCB4DBD1-1605-4CBA-8FC9-F137AE66C24E}"/>
+              </a:ext>
+            </a:extLst>
+          </p:cNvPr>
+          <p:cNvSpPr>
+            <a:spLocks noGrp="1"/>
+          </p:cNvSpPr>
+          <p:nvPr>
+            <p:ph type="title"/>
+          </p:nvPr>
+        </p:nvSpPr>
+        <p:spPr/>
+        <p:txBody>
+          <a:bodyPr/>
+          <a:lstStyle/>
+          <a:p>
+            <a:r>
+              <a:rPr lang="en-US" dirty="0"/>
+              <a:t>Box Plot</a:t>
+            </a:r>
+          </a:p>
+        </p:txBody>
+      </p:sp>
+      <p:sp>
+        <p:nvSpPr>
+          <p:cNvPr id="3" name="Content Placeholder 2">
+            <a:extLst>
+              <a:ext uri="{FF2B5EF4-FFF2-40B4-BE49-F238E27FC236}">
+                <a16:creationId xmlns:a16="http://schemas.microsoft.com/office/drawing/2014/main" id="{325EA30B-0266-4DBB-B77A-7B1946D4EDB7}"/>
+              </a:ext>
+            </a:extLst>
+          </p:cNvPr>
+          <p:cNvSpPr>
+            <a:spLocks noGrp="1"/>
+          </p:cNvSpPr>
+          <p:nvPr>
+            <p:ph sz="half" idx="1"/>
+          </p:nvPr>
+        </p:nvSpPr>
+        <p:spPr/>
+        <p:txBody>
+          <a:bodyPr/>
+          <a:lstStyle/>
+          <a:p>
+            <a:r>
+              <a:rPr lang="en-US" dirty="0"/>
+              <a:t>Is useful for those who want to know the maximum value and minimum value.</a:t>
+            </a:r>
+          </a:p>
+          <a:p>
+            <a:r>
+              <a:rPr lang="en-US" dirty="0"/>
+              <a:t>Also it shows the quartile and it’s values </a:t>
+            </a:r>
+          </a:p>
+          <a:p>
+            <a:r>
+              <a:rPr lang="en-US" dirty="0"/>
+              <a:t>Show the outliers, use it for data wrangling.</a:t>
+            </a:r>
+          </a:p>
+          <a:p>
+            <a:r>
+              <a:rPr lang="en-US" dirty="0"/>
+              <a:t>Shows mean and median, standard deviation.</a:t>
+            </a:r>
+          </a:p>
+          <a:p>
+            <a:endParaRPr lang="en-US" dirty="0"/>
+          </a:p>
+        </p:txBody>
+      </p:sp>
+      <p:pic>
+        <p:nvPicPr>
+          <p:cNvPr id="6" name="Content Placeholder 5">
+            <a:extLst>
+              <a:ext uri="{FF2B5EF4-FFF2-40B4-BE49-F238E27FC236}">
+                <a16:creationId xmlns:a16="http://schemas.microsoft.com/office/drawing/2014/main" id="{AE635328-1FB0-4A91-8954-958A9EF4F4ED}"/>
+              </a:ext>
+            </a:extLst>
+          </p:cNvPr>
+          <p:cNvPicPr>
+            <a:picLocks noGrp="1" noChangeAspect="1"/>
+          </p:cNvPicPr>
+          <p:nvPr>
+            <p:ph sz="half" idx="2"/>
+          </p:nvPr>
+        </p:nvPicPr>
+        <p:blipFill>
+          <a:blip r:embed="rId2"/>
+          <a:stretch>
+            <a:fillRect/>
+          </a:stretch>
+        </p:blipFill>
+        <p:spPr>
+          <a:xfrm>
+            <a:off x="6461125" y="2213505"/>
+            <a:ext cx="4664075" cy="3527953"/>
+          </a:xfrm>
+        </p:spPr>
+      </p:pic>
+    </p:spTree>
+    <p:extLst>
+      <p:ext uri="{BB962C8B-B14F-4D97-AF65-F5344CB8AC3E}">
+        <p14:creationId xmlns:p14="http://schemas.microsoft.com/office/powerpoint/2010/main" val="922199565"/>
+      </p:ext>
+    </p:extLst>
+  </p:cSld>
+  <p:clrMapOvr>
+    <a:masterClrMapping/>
+  </p:clrMapOvr>
+</p:sld>
+</file>
+
+<file path=ppt/slides/slide11.xml><?xml version="1.0" encoding="utf-8"?>
+<p:sld xmlns:a="http://schemas.openxmlformats.org/drawingml/2006/main" xmlns:r="http://schemas.openxmlformats.org/officeDocument/2006/relationships" xmlns:p="http://schemas.openxmlformats.org/presentationml/2006/main">
+  <p:cSld>
+    <p:spTree>
+      <p:nvGrpSpPr>
+        <p:cNvPr id="1" name=""/>
+        <p:cNvGrpSpPr/>
+        <p:nvPr/>
+      </p:nvGrpSpPr>
+      <p:grpSpPr>
+        <a:xfrm>
+          <a:off x="0" y="0"/>
+          <a:ext cx="0" cy="0"/>
+          <a:chOff x="0" y="0"/>
+          <a:chExt cx="0" cy="0"/>
+        </a:xfrm>
+      </p:grpSpPr>
+      <p:sp>
+        <p:nvSpPr>
+          <p:cNvPr id="2" name="Title 1">
+            <a:extLst>
+              <a:ext uri="{FF2B5EF4-FFF2-40B4-BE49-F238E27FC236}">
                 <a16:creationId xmlns:a16="http://schemas.microsoft.com/office/drawing/2014/main" id="{7F27C4B4-CD11-455D-AD97-F7C6B03CAD32}"/>
               </a:ext>
             </a:extLst>
@@ -7177,7 +7314,7 @@
           <a:bodyPr/>
           <a:lstStyle/>
           <a:p>
-            <a:endParaRPr lang="en-US"/>
+            <a:endParaRPr lang="en-US" dirty="0"/>
           </a:p>
         </p:txBody>
       </p:sp>
@@ -7202,7 +7339,7 @@
           <a:bodyPr/>
           <a:lstStyle/>
           <a:p>
-            <a:endParaRPr lang="en-US"/>
+            <a:endParaRPr lang="en-US" dirty="0"/>
           </a:p>
         </p:txBody>
       </p:sp>
@@ -7457,8 +7594,8 @@
           </a:p>
         </p:txBody>
       </p:sp>
-      <mc:AlternateContent xmlns:mc="http://schemas.openxmlformats.org/markup-compatibility/2006">
-        <mc:Choice xmlns:a14="http://schemas.microsoft.com/office/drawing/2010/main" Requires="a14">
+      <mc:AlternateContent xmlns:mc="http://schemas.openxmlformats.org/markup-compatibility/2006" xmlns:a14="http://schemas.microsoft.com/office/drawing/2010/main">
+        <mc:Choice Requires="a14">
           <p:graphicFrame>
             <p:nvGraphicFramePr>
               <p:cNvPr id="4" name="Table 4">
@@ -7475,7 +7612,7 @@
                 <p:ph idx="1"/>
                 <p:extLst>
                   <p:ext uri="{D42A27DB-BD31-4B8C-83A1-F6EECF244321}">
-                    <p14:modId xmlns:p14="http://schemas.microsoft.com/office/powerpoint/2010/main" val="615803647"/>
+                    <p14:modId xmlns:p14="http://schemas.microsoft.com/office/powerpoint/2010/main" val="1163593214"/>
                   </p:ext>
                 </p:extLst>
               </p:nvPr>
@@ -7662,30 +7799,24 @@
                                               </a:rPr>
                                               <m:t>​−</m:t>
                                             </m:r>
-                                            <m:r>
-                                              <m:rPr>
-                                                <m:nor/>
-                                              </m:rPr>
-                                              <a:rPr lang="en-US" b="0" i="1" dirty="0" smtClean="0">
-                                                <a:latin typeface="Cambria Math" panose="02040503050406030204" pitchFamily="18" charset="0"/>
-                                              </a:rPr>
-                                              <m:t>x</m:t>
-                                            </m:r>
-                                            <m:r>
-                                              <m:rPr>
-                                                <m:nor/>
-                                              </m:rPr>
-                                              <a:rPr lang="en-US" sz="1800" b="0" i="0" kern="1200" smtClean="0">
-                                                <a:solidFill>
-                                                  <a:schemeClr val="lt1"/>
-                                                </a:solidFill>
-                                                <a:effectLst/>
-                                                <a:latin typeface="+mn-lt"/>
-                                                <a:ea typeface="+mn-ea"/>
-                                                <a:cs typeface="+mn-cs"/>
-                                              </a:rPr>
-                                              <m:t>ˉ</m:t>
-                                            </m:r>
+                                            <m:acc>
+                                              <m:accPr>
+                                                <m:chr m:val="̃"/>
+                                                <m:ctrlPr>
+                                                  <a:rPr lang="en-US" b="0" i="1" dirty="0" smtClean="0">
+                                                    <a:latin typeface="Cambria Math" panose="02040503050406030204" pitchFamily="18" charset="0"/>
+                                                  </a:rPr>
+                                                </m:ctrlPr>
+                                              </m:accPr>
+                                              <m:e>
+                                                <m:r>
+                                                  <a:rPr lang="en-US" b="0" i="1" dirty="0" smtClean="0">
+                                                    <a:latin typeface="Cambria Math" panose="02040503050406030204" pitchFamily="18" charset="0"/>
+                                                  </a:rPr>
+                                                  <m:t>𝑥</m:t>
+                                                </m:r>
+                                              </m:e>
+                                            </m:acc>
                                           </m:num>
                                           <m:den>
                                             <m:r>
@@ -7737,6 +7868,212 @@
                           <a:pPr algn="ctr"/>
                           <a:endParaRPr lang="en-US" dirty="0"/>
                         </a:p>
+                        <a:p>
+                          <a:pPr algn="ctr"/>
+                          <a14:m>
+                            <m:oMathPara xmlns:m="http://schemas.openxmlformats.org/officeDocument/2006/math">
+                              <m:oMathParaPr>
+                                <m:jc m:val="centerGroup"/>
+                              </m:oMathParaPr>
+                              <m:oMath xmlns:m="http://schemas.openxmlformats.org/officeDocument/2006/math">
+                                <m:f>
+                                  <m:fPr>
+                                    <m:ctrlPr>
+                                      <a:rPr lang="pt-BR" i="1" dirty="0" smtClean="0">
+                                        <a:latin typeface="Cambria Math" panose="02040503050406030204" pitchFamily="18" charset="0"/>
+                                      </a:rPr>
+                                    </m:ctrlPr>
+                                  </m:fPr>
+                                  <m:num>
+                                    <m:r>
+                                      <a:rPr lang="pt-BR" i="1" dirty="0" smtClean="0">
+                                        <a:latin typeface="Cambria Math" panose="02040503050406030204" pitchFamily="18" charset="0"/>
+                                      </a:rPr>
+                                      <m:t>𝑛</m:t>
+                                    </m:r>
+                                    <m:r>
+                                      <a:rPr lang="pt-BR" i="1" dirty="0" smtClean="0">
+                                        <a:latin typeface="Cambria Math" panose="02040503050406030204" pitchFamily="18" charset="0"/>
+                                      </a:rPr>
+                                      <m:t>(</m:t>
+                                    </m:r>
+                                    <m:r>
+                                      <a:rPr lang="pt-BR" i="1" dirty="0" smtClean="0">
+                                        <a:latin typeface="Cambria Math" panose="02040503050406030204" pitchFamily="18" charset="0"/>
+                                      </a:rPr>
+                                      <m:t>𝑛</m:t>
+                                    </m:r>
+                                    <m:r>
+                                      <a:rPr lang="pt-BR" i="1" dirty="0" smtClean="0">
+                                        <a:latin typeface="Cambria Math" panose="02040503050406030204" pitchFamily="18" charset="0"/>
+                                      </a:rPr>
+                                      <m:t>−1)(</m:t>
+                                    </m:r>
+                                    <m:r>
+                                      <a:rPr lang="pt-BR" i="1" dirty="0" smtClean="0">
+                                        <a:latin typeface="Cambria Math" panose="02040503050406030204" pitchFamily="18" charset="0"/>
+                                      </a:rPr>
+                                      <m:t>𝑛</m:t>
+                                    </m:r>
+                                    <m:r>
+                                      <a:rPr lang="pt-BR" i="1" dirty="0" smtClean="0">
+                                        <a:latin typeface="Cambria Math" panose="02040503050406030204" pitchFamily="18" charset="0"/>
+                                      </a:rPr>
+                                      <m:t>−2)</m:t>
+                                    </m:r>
+                                  </m:num>
+                                  <m:den>
+                                    <m:r>
+                                      <a:rPr lang="pt-BR" i="1" dirty="0" smtClean="0">
+                                        <a:latin typeface="Cambria Math" panose="02040503050406030204" pitchFamily="18" charset="0"/>
+                                      </a:rPr>
+                                      <m:t>(</m:t>
+                                    </m:r>
+                                    <m:r>
+                                      <a:rPr lang="pt-BR" i="1" dirty="0" smtClean="0">
+                                        <a:latin typeface="Cambria Math" panose="02040503050406030204" pitchFamily="18" charset="0"/>
+                                      </a:rPr>
+                                      <m:t>𝑛</m:t>
+                                    </m:r>
+                                    <m:r>
+                                      <a:rPr lang="pt-BR" i="1" dirty="0" smtClean="0">
+                                        <a:latin typeface="Cambria Math" panose="02040503050406030204" pitchFamily="18" charset="0"/>
+                                      </a:rPr>
+                                      <m:t>)</m:t>
+                                    </m:r>
+                                    <m:sSup>
+                                      <m:sSupPr>
+                                        <m:ctrlPr>
+                                          <a:rPr lang="pt-BR" i="1" dirty="0" smtClean="0">
+                                            <a:latin typeface="Cambria Math" panose="02040503050406030204" pitchFamily="18" charset="0"/>
+                                          </a:rPr>
+                                        </m:ctrlPr>
+                                      </m:sSupPr>
+                                      <m:e>
+                                        <m:r>
+                                          <a:rPr lang="pt-BR" i="1" dirty="0" smtClean="0">
+                                            <a:latin typeface="Cambria Math" panose="02040503050406030204" pitchFamily="18" charset="0"/>
+                                          </a:rPr>
+                                          <m:t>𝑠</m:t>
+                                        </m:r>
+                                      </m:e>
+                                      <m:sup>
+                                        <m:r>
+                                          <a:rPr lang="pt-BR" i="1" dirty="0" smtClean="0">
+                                            <a:latin typeface="Cambria Math" panose="02040503050406030204" pitchFamily="18" charset="0"/>
+                                          </a:rPr>
+                                          <m:t>4</m:t>
+                                        </m:r>
+                                      </m:sup>
+                                    </m:sSup>
+                                  </m:den>
+                                </m:f>
+                                <m:r>
+                                  <a:rPr lang="pt-BR" i="1" dirty="0" smtClean="0">
+                                    <a:latin typeface="Cambria Math" panose="02040503050406030204" pitchFamily="18" charset="0"/>
+                                  </a:rPr>
+                                  <m:t>​</m:t>
+                                </m:r>
+                                <m:nary>
+                                  <m:naryPr>
+                                    <m:chr m:val="∑"/>
+                                    <m:ctrlPr>
+                                      <a:rPr lang="pt-BR" i="1" dirty="0" smtClean="0">
+                                        <a:latin typeface="Cambria Math" panose="02040503050406030204" pitchFamily="18" charset="0"/>
+                                      </a:rPr>
+                                    </m:ctrlPr>
+                                  </m:naryPr>
+                                  <m:sub>
+                                    <m:r>
+                                      <a:rPr lang="pt-BR" i="1" dirty="0" smtClean="0">
+                                        <a:latin typeface="Cambria Math" panose="02040503050406030204" pitchFamily="18" charset="0"/>
+                                      </a:rPr>
+                                      <m:t>𝑖</m:t>
+                                    </m:r>
+                                    <m:r>
+                                      <a:rPr lang="pt-BR" i="1" dirty="0" smtClean="0">
+                                        <a:latin typeface="Cambria Math" panose="02040503050406030204" pitchFamily="18" charset="0"/>
+                                      </a:rPr>
+                                      <m:t>=1</m:t>
+                                    </m:r>
+                                  </m:sub>
+                                  <m:sup>
+                                    <m:r>
+                                      <a:rPr lang="pt-BR" i="1" dirty="0" smtClean="0">
+                                        <a:latin typeface="Cambria Math" panose="02040503050406030204" pitchFamily="18" charset="0"/>
+                                      </a:rPr>
+                                      <m:t>𝑛</m:t>
+                                    </m:r>
+                                  </m:sup>
+                                  <m:e>
+                                    <m:sSup>
+                                      <m:sSupPr>
+                                        <m:ctrlPr>
+                                          <a:rPr lang="pt-BR" i="1" dirty="0" smtClean="0">
+                                            <a:latin typeface="Cambria Math" panose="02040503050406030204" pitchFamily="18" charset="0"/>
+                                          </a:rPr>
+                                        </m:ctrlPr>
+                                      </m:sSupPr>
+                                      <m:e>
+                                        <m:r>
+                                          <a:rPr lang="pt-BR" i="1" dirty="0" smtClean="0">
+                                            <a:latin typeface="Cambria Math" panose="02040503050406030204" pitchFamily="18" charset="0"/>
+                                          </a:rPr>
+                                          <m:t>(</m:t>
+                                        </m:r>
+                                        <m:r>
+                                          <a:rPr lang="pt-BR" i="1" dirty="0" smtClean="0">
+                                            <a:latin typeface="Cambria Math" panose="02040503050406030204" pitchFamily="18" charset="0"/>
+                                          </a:rPr>
+                                          <m:t>𝑥𝑖</m:t>
+                                        </m:r>
+                                        <m:r>
+                                          <a:rPr lang="pt-BR" i="1" dirty="0" smtClean="0">
+                                            <a:latin typeface="Cambria Math" panose="02040503050406030204" pitchFamily="18" charset="0"/>
+                                          </a:rPr>
+                                          <m:t>​−</m:t>
+                                        </m:r>
+                                        <m:acc>
+                                          <m:accPr>
+                                            <m:chr m:val="̃"/>
+                                            <m:ctrlPr>
+                                              <a:rPr lang="pt-BR" i="1" dirty="0" smtClean="0">
+                                                <a:latin typeface="Cambria Math" panose="02040503050406030204" pitchFamily="18" charset="0"/>
+                                              </a:rPr>
+                                            </m:ctrlPr>
+                                          </m:accPr>
+                                          <m:e>
+                                            <m:r>
+                                              <a:rPr lang="en-US" b="1" i="1" dirty="0" smtClean="0">
+                                                <a:latin typeface="Cambria Math" panose="02040503050406030204" pitchFamily="18" charset="0"/>
+                                              </a:rPr>
+                                              <m:t>𝒙</m:t>
+                                            </m:r>
+                                          </m:e>
+                                        </m:acc>
+                                        <m:r>
+                                          <a:rPr lang="pt-BR" i="1" dirty="0" smtClean="0">
+                                            <a:latin typeface="Cambria Math" panose="02040503050406030204" pitchFamily="18" charset="0"/>
+                                          </a:rPr>
+                                          <m:t>)</m:t>
+                                        </m:r>
+                                      </m:e>
+                                      <m:sup>
+                                        <m:r>
+                                          <a:rPr lang="pt-BR" i="1" dirty="0" smtClean="0">
+                                            <a:latin typeface="Cambria Math" panose="02040503050406030204" pitchFamily="18" charset="0"/>
+                                          </a:rPr>
+                                          <m:t>4</m:t>
+                                        </m:r>
+                                      </m:sup>
+                                    </m:sSup>
+                                  </m:e>
+                                </m:nary>
+                              </m:oMath>
+                            </m:oMathPara>
+                          </a14:m>
+                          <a:endParaRPr lang="en-US" dirty="0"/>
+                        </a:p>
                       </a:txBody>
                       <a:tcPr/>
                     </a:tc>
@@ -7778,7 +8115,7 @@
             </a:graphic>
           </p:graphicFrame>
         </mc:Choice>
-        <mc:Fallback>
+        <mc:Fallback xmlns="">
           <p:graphicFrame>
             <p:nvGraphicFramePr>
               <p:cNvPr id="4" name="Table 4">
@@ -7795,7 +8132,7 @@
                 <p:ph idx="1"/>
                 <p:extLst>
                   <p:ext uri="{D42A27DB-BD31-4B8C-83A1-F6EECF244321}">
-                    <p14:modId xmlns:p14="http://schemas.microsoft.com/office/powerpoint/2010/main" val="615803647"/>
+                    <p14:modId xmlns:p14="http://schemas.microsoft.com/office/powerpoint/2010/main" val="1163593214"/>
                   </p:ext>
                 </p:extLst>
               </p:nvPr>
@@ -7849,18 +8186,17 @@
                         <a:bodyPr/>
                         <a:lstStyle/>
                         <a:p>
-                          <a:pPr algn="ctr"/>
-                          <a:r>
-                            <a:rPr lang="en-US" dirty="0"/>
-                            <a:t>Kurtosis</a:t>
-                          </a:r>
-                        </a:p>
-                        <a:p>
-                          <a:pPr algn="ctr"/>
-                          <a:endParaRPr lang="en-US" dirty="0"/>
+                          <a:endParaRPr lang="en-US"/>
                         </a:p>
                       </a:txBody>
-                      <a:tcPr/>
+                      <a:tcPr>
+                        <a:blipFill>
+                          <a:blip r:embed="rId2"/>
+                          <a:stretch>
+                            <a:fillRect l="-100238" t="-1992" r="-475" b="-100398"/>
+                          </a:stretch>
+                        </a:blipFill>
+                      </a:tcPr>
                     </a:tc>
                     <a:extLst>
                       <a:ext uri="{0D108BD9-81ED-4DB2-BD59-A6C34878D82A}">
@@ -7996,6 +8332,442 @@
           <p:cNvPr id="2" name="Title 1">
             <a:extLst>
               <a:ext uri="{FF2B5EF4-FFF2-40B4-BE49-F238E27FC236}">
+                <a16:creationId xmlns:a16="http://schemas.microsoft.com/office/drawing/2014/main" id="{444A181D-DBAF-447C-8A0B-9FDD082D9A7A}"/>
+              </a:ext>
+            </a:extLst>
+          </p:cNvPr>
+          <p:cNvSpPr>
+            <a:spLocks noGrp="1"/>
+          </p:cNvSpPr>
+          <p:nvPr>
+            <p:ph type="title"/>
+          </p:nvPr>
+        </p:nvSpPr>
+        <p:spPr/>
+        <p:txBody>
+          <a:bodyPr/>
+          <a:lstStyle/>
+          <a:p>
+            <a:r>
+              <a:rPr lang="en-US" dirty="0"/>
+              <a:t>Example for calculating skewness and kurtosis</a:t>
+            </a:r>
+          </a:p>
+        </p:txBody>
+      </p:sp>
+      <mc:AlternateContent xmlns:mc="http://schemas.openxmlformats.org/markup-compatibility/2006" xmlns:a14="http://schemas.microsoft.com/office/drawing/2010/main">
+        <mc:Choice Requires="a14">
+          <p:sp>
+            <p:nvSpPr>
+              <p:cNvPr id="4" name="Content Placeholder 3">
+                <a:extLst>
+                  <a:ext uri="{FF2B5EF4-FFF2-40B4-BE49-F238E27FC236}">
+                    <a16:creationId xmlns:a16="http://schemas.microsoft.com/office/drawing/2014/main" id="{08469298-AC43-402C-AC68-203336027CA3}"/>
+                  </a:ext>
+                </a:extLst>
+              </p:cNvPr>
+              <p:cNvSpPr>
+                <a:spLocks noGrp="1"/>
+              </p:cNvSpPr>
+              <p:nvPr>
+                <p:ph sz="half" idx="1"/>
+              </p:nvPr>
+            </p:nvSpPr>
+            <p:spPr/>
+            <p:txBody>
+              <a:bodyPr/>
+              <a:lstStyle/>
+              <a:p>
+                <a:r>
+                  <a:rPr lang="en-US" dirty="0"/>
+                  <a:t>{2,3,5,7,8,9,10,12,13,15}</a:t>
+                </a:r>
+              </a:p>
+              <a:p>
+                <a:r>
+                  <a:rPr lang="en-US" dirty="0"/>
+                  <a:t>According to this data calculating the mean (</a:t>
+                </a:r>
+                <a14:m>
+                  <m:oMath xmlns:m="http://schemas.openxmlformats.org/officeDocument/2006/math">
+                    <m:acc>
+                      <m:accPr>
+                        <m:chr m:val="̃"/>
+                        <m:ctrlPr>
+                          <a:rPr lang="en-US" i="1" smtClean="0">
+                            <a:latin typeface="Cambria Math" panose="02040503050406030204" pitchFamily="18" charset="0"/>
+                          </a:rPr>
+                        </m:ctrlPr>
+                      </m:accPr>
+                      <m:e>
+                        <m:r>
+                          <a:rPr lang="en-US" b="0" i="1" smtClean="0">
+                            <a:latin typeface="Cambria Math" panose="02040503050406030204" pitchFamily="18" charset="0"/>
+                          </a:rPr>
+                          <m:t>𝑥</m:t>
+                        </m:r>
+                      </m:e>
+                    </m:acc>
+                  </m:oMath>
+                </a14:m>
+                <a:r>
+                  <a:rPr lang="en-US" dirty="0"/>
+                  <a:t>) = </a:t>
+                </a:r>
+                <a14:m>
+                  <m:oMath xmlns:m="http://schemas.openxmlformats.org/officeDocument/2006/math">
+                    <m:f>
+                      <m:fPr>
+                        <m:ctrlPr>
+                          <a:rPr lang="en-US" i="1" smtClean="0">
+                            <a:latin typeface="Cambria Math" panose="02040503050406030204" pitchFamily="18" charset="0"/>
+                          </a:rPr>
+                        </m:ctrlPr>
+                      </m:fPr>
+                      <m:num>
+                        <m:nary>
+                          <m:naryPr>
+                            <m:chr m:val="∑"/>
+                            <m:subHide m:val="on"/>
+                            <m:supHide m:val="on"/>
+                            <m:ctrlPr>
+                              <a:rPr lang="en-US" i="1" smtClean="0">
+                                <a:latin typeface="Cambria Math" panose="02040503050406030204" pitchFamily="18" charset="0"/>
+                              </a:rPr>
+                            </m:ctrlPr>
+                          </m:naryPr>
+                          <m:sub/>
+                          <m:sup/>
+                          <m:e>
+                            <m:r>
+                              <a:rPr lang="en-US" b="0" i="1" smtClean="0">
+                                <a:latin typeface="Cambria Math" panose="02040503050406030204" pitchFamily="18" charset="0"/>
+                              </a:rPr>
+                              <m:t>𝑥𝑖</m:t>
+                            </m:r>
+                          </m:e>
+                        </m:nary>
+                      </m:num>
+                      <m:den>
+                        <m:r>
+                          <a:rPr lang="en-US" b="0" i="1" smtClean="0">
+                            <a:latin typeface="Cambria Math" panose="02040503050406030204" pitchFamily="18" charset="0"/>
+                          </a:rPr>
+                          <m:t>𝑛</m:t>
+                        </m:r>
+                      </m:den>
+                    </m:f>
+                    <m:r>
+                      <a:rPr lang="en-US" b="0" i="1" smtClean="0">
+                        <a:latin typeface="Cambria Math" panose="02040503050406030204" pitchFamily="18" charset="0"/>
+                      </a:rPr>
+                      <m:t>=8.4 ,</m:t>
+                    </m:r>
+                  </m:oMath>
+                </a14:m>
+                <a:r>
+                  <a:rPr lang="en-US" dirty="0"/>
+                  <a:t> S.D (s) = </a:t>
+                </a:r>
+                <a14:m>
+                  <m:oMath xmlns:m="http://schemas.openxmlformats.org/officeDocument/2006/math">
+                    <m:rad>
+                      <m:radPr>
+                        <m:degHide m:val="on"/>
+                        <m:ctrlPr>
+                          <a:rPr lang="en-US" i="1" smtClean="0">
+                            <a:latin typeface="Cambria Math" panose="02040503050406030204" pitchFamily="18" charset="0"/>
+                          </a:rPr>
+                        </m:ctrlPr>
+                      </m:radPr>
+                      <m:deg/>
+                      <m:e>
+                        <m:f>
+                          <m:fPr>
+                            <m:ctrlPr>
+                              <a:rPr lang="en-US" i="1">
+                                <a:latin typeface="Cambria Math" panose="02040503050406030204" pitchFamily="18" charset="0"/>
+                              </a:rPr>
+                            </m:ctrlPr>
+                          </m:fPr>
+                          <m:num>
+                            <m:nary>
+                              <m:naryPr>
+                                <m:chr m:val="∑"/>
+                                <m:subHide m:val="on"/>
+                                <m:supHide m:val="on"/>
+                                <m:ctrlPr>
+                                  <a:rPr lang="en-US" i="1" smtClean="0">
+                                    <a:latin typeface="Cambria Math" panose="02040503050406030204" pitchFamily="18" charset="0"/>
+                                  </a:rPr>
+                                </m:ctrlPr>
+                              </m:naryPr>
+                              <m:sub/>
+                              <m:sup/>
+                              <m:e>
+                                <m:sSup>
+                                  <m:sSupPr>
+                                    <m:ctrlPr>
+                                      <a:rPr lang="en-US" b="0" i="1" smtClean="0">
+                                        <a:latin typeface="Cambria Math" panose="02040503050406030204" pitchFamily="18" charset="0"/>
+                                      </a:rPr>
+                                    </m:ctrlPr>
+                                  </m:sSupPr>
+                                  <m:e>
+                                    <m:r>
+                                      <a:rPr lang="en-US" i="1">
+                                        <a:latin typeface="Cambria Math" panose="02040503050406030204" pitchFamily="18" charset="0"/>
+                                      </a:rPr>
+                                      <m:t>(</m:t>
+                                    </m:r>
+                                    <m:r>
+                                      <a:rPr lang="en-US" b="0" i="1" smtClean="0">
+                                        <a:latin typeface="Cambria Math" panose="02040503050406030204" pitchFamily="18" charset="0"/>
+                                      </a:rPr>
+                                      <m:t>𝑥𝑖</m:t>
+                                    </m:r>
+                                    <m:r>
+                                      <a:rPr lang="en-US" b="0" i="1" smtClean="0">
+                                        <a:latin typeface="Cambria Math" panose="02040503050406030204" pitchFamily="18" charset="0"/>
+                                      </a:rPr>
+                                      <m:t>−</m:t>
+                                    </m:r>
+                                    <m:acc>
+                                      <m:accPr>
+                                        <m:chr m:val="̃"/>
+                                        <m:ctrlPr>
+                                          <a:rPr lang="en-US" b="0" i="1" smtClean="0">
+                                            <a:latin typeface="Cambria Math" panose="02040503050406030204" pitchFamily="18" charset="0"/>
+                                          </a:rPr>
+                                        </m:ctrlPr>
+                                      </m:accPr>
+                                      <m:e>
+                                        <m:r>
+                                          <a:rPr lang="en-US" b="0" i="1" smtClean="0">
+                                            <a:latin typeface="Cambria Math" panose="02040503050406030204" pitchFamily="18" charset="0"/>
+                                          </a:rPr>
+                                          <m:t>𝑥</m:t>
+                                        </m:r>
+                                      </m:e>
+                                    </m:acc>
+                                    <m:r>
+                                      <a:rPr lang="en-US" i="1">
+                                        <a:latin typeface="Cambria Math" panose="02040503050406030204" pitchFamily="18" charset="0"/>
+                                      </a:rPr>
+                                      <m:t>)</m:t>
+                                    </m:r>
+                                  </m:e>
+                                  <m:sup>
+                                    <m:r>
+                                      <a:rPr lang="en-US" b="0" i="1" smtClean="0">
+                                        <a:latin typeface="Cambria Math" panose="02040503050406030204" pitchFamily="18" charset="0"/>
+                                      </a:rPr>
+                                      <m:t>2</m:t>
+                                    </m:r>
+                                  </m:sup>
+                                </m:sSup>
+                              </m:e>
+                            </m:nary>
+                          </m:num>
+                          <m:den>
+                            <m:r>
+                              <a:rPr lang="en-US" b="0" i="1" smtClean="0">
+                                <a:latin typeface="Cambria Math" panose="02040503050406030204" pitchFamily="18" charset="0"/>
+                              </a:rPr>
+                              <m:t>(</m:t>
+                            </m:r>
+                            <m:r>
+                              <a:rPr lang="en-US" b="0" i="1" smtClean="0">
+                                <a:latin typeface="Cambria Math" panose="02040503050406030204" pitchFamily="18" charset="0"/>
+                              </a:rPr>
+                              <m:t>𝑛</m:t>
+                            </m:r>
+                            <m:r>
+                              <a:rPr lang="en-US" b="0" i="1" smtClean="0">
+                                <a:latin typeface="Cambria Math" panose="02040503050406030204" pitchFamily="18" charset="0"/>
+                              </a:rPr>
+                              <m:t>−1)</m:t>
+                            </m:r>
+                          </m:den>
+                        </m:f>
+                      </m:e>
+                    </m:rad>
+                    <m:r>
+                      <a:rPr lang="en-US" b="0" i="1" smtClean="0">
+                        <a:latin typeface="Cambria Math" panose="02040503050406030204" pitchFamily="18" charset="0"/>
+                      </a:rPr>
+                      <m:t>=4.273.</m:t>
+                    </m:r>
+                  </m:oMath>
+                </a14:m>
+                <a:endParaRPr lang="en-US" b="0" dirty="0"/>
+              </a:p>
+              <a:p>
+                <a:r>
+                  <a:rPr lang="en-US" dirty="0"/>
+                  <a:t>According to kurtosis and skewness laws</a:t>
+                </a:r>
+              </a:p>
+              <a:p>
+                <a:r>
+                  <a:rPr lang="en-US" dirty="0"/>
+                  <a:t>Kurtosis = −1.081+3 = 1.919</a:t>
+                </a:r>
+              </a:p>
+              <a:p>
+                <a:r>
+                  <a:rPr lang="en-US" dirty="0"/>
+                  <a:t>Skewness = −0.039</a:t>
+                </a:r>
+              </a:p>
+            </p:txBody>
+          </p:sp>
+        </mc:Choice>
+        <mc:Fallback xmlns="">
+          <p:sp>
+            <p:nvSpPr>
+              <p:cNvPr id="4" name="Content Placeholder 3">
+                <a:extLst>
+                  <a:ext uri="{FF2B5EF4-FFF2-40B4-BE49-F238E27FC236}">
+                    <a16:creationId xmlns:a16="http://schemas.microsoft.com/office/drawing/2014/main" id="{08469298-AC43-402C-AC68-203336027CA3}"/>
+                  </a:ext>
+                </a:extLst>
+              </p:cNvPr>
+              <p:cNvSpPr>
+                <a:spLocks noGrp="1" noRot="1" noChangeAspect="1" noMove="1" noResize="1" noEditPoints="1" noAdjustHandles="1" noChangeArrowheads="1" noChangeShapeType="1" noTextEdit="1"/>
+              </p:cNvSpPr>
+              <p:nvPr>
+                <p:ph sz="half" idx="1"/>
+              </p:nvPr>
+            </p:nvSpPr>
+            <p:spPr>
+              <a:blipFill>
+                <a:blip r:embed="rId2"/>
+                <a:stretch>
+                  <a:fillRect l="-915"/>
+                </a:stretch>
+              </a:blipFill>
+            </p:spPr>
+            <p:txBody>
+              <a:bodyPr/>
+              <a:lstStyle/>
+              <a:p>
+                <a:r>
+                  <a:rPr lang="en-US">
+                    <a:noFill/>
+                  </a:rPr>
+                  <a:t> </a:t>
+                </a:r>
+              </a:p>
+            </p:txBody>
+          </p:sp>
+        </mc:Fallback>
+      </mc:AlternateContent>
+      <p:sp>
+        <p:nvSpPr>
+          <p:cNvPr id="5" name="Content Placeholder 4">
+            <a:extLst>
+              <a:ext uri="{FF2B5EF4-FFF2-40B4-BE49-F238E27FC236}">
+                <a16:creationId xmlns:a16="http://schemas.microsoft.com/office/drawing/2014/main" id="{92F28CC8-3E6B-44C8-94E4-FCBC4D5D916A}"/>
+              </a:ext>
+            </a:extLst>
+          </p:cNvPr>
+          <p:cNvSpPr>
+            <a:spLocks noGrp="1"/>
+          </p:cNvSpPr>
+          <p:nvPr>
+            <p:ph sz="half" idx="2"/>
+          </p:nvPr>
+        </p:nvSpPr>
+        <p:spPr/>
+        <p:txBody>
+          <a:bodyPr/>
+          <a:lstStyle/>
+          <a:p>
+            <a:r>
+              <a:rPr lang="en-US" dirty="0"/>
+              <a:t>We need to now that in denominator in kurtosis law may be you subtract by 3 or not this is for standardization .</a:t>
+            </a:r>
+          </a:p>
+          <a:p>
+            <a:r>
+              <a:rPr lang="en-US" dirty="0"/>
+              <a:t>Also we  add 3 cause in python function it’s subtract by 3 .</a:t>
+            </a:r>
+          </a:p>
+          <a:p>
+            <a:pPr marL="0" indent="0">
+              <a:buNone/>
+            </a:pPr>
+            <a:endParaRPr lang="en-US" dirty="0"/>
+          </a:p>
+        </p:txBody>
+      </p:sp>
+      <p:pic>
+        <p:nvPicPr>
+          <p:cNvPr id="7" name="Picture 6">
+            <a:extLst>
+              <a:ext uri="{FF2B5EF4-FFF2-40B4-BE49-F238E27FC236}">
+                <a16:creationId xmlns:a16="http://schemas.microsoft.com/office/drawing/2014/main" id="{368FE979-BF7E-44B7-8144-C99E9C53ECB9}"/>
+              </a:ext>
+            </a:extLst>
+          </p:cNvPr>
+          <p:cNvPicPr>
+            <a:picLocks noChangeAspect="1"/>
+          </p:cNvPicPr>
+          <p:nvPr/>
+        </p:nvPicPr>
+        <p:blipFill>
+          <a:blip r:embed="rId3"/>
+          <a:stretch>
+            <a:fillRect/>
+          </a:stretch>
+        </p:blipFill>
+        <p:spPr>
+          <a:xfrm>
+            <a:off x="6580770" y="4278143"/>
+            <a:ext cx="4652405" cy="1574017"/>
+          </a:xfrm>
+          <a:prstGeom prst="rect">
+            <a:avLst/>
+          </a:prstGeom>
+        </p:spPr>
+      </p:pic>
+    </p:spTree>
+    <p:extLst>
+      <p:ext uri="{BB962C8B-B14F-4D97-AF65-F5344CB8AC3E}">
+        <p14:creationId xmlns:p14="http://schemas.microsoft.com/office/powerpoint/2010/main" val="1322863776"/>
+      </p:ext>
+    </p:extLst>
+  </p:cSld>
+  <p:clrMapOvr>
+    <a:masterClrMapping/>
+  </p:clrMapOvr>
+</p:sld>
+</file>
+
+<file path=ppt/slides/slide5.xml><?xml version="1.0" encoding="utf-8"?>
+<p:sld xmlns:a="http://schemas.openxmlformats.org/drawingml/2006/main" xmlns:r="http://schemas.openxmlformats.org/officeDocument/2006/relationships" xmlns:p="http://schemas.openxmlformats.org/presentationml/2006/main">
+  <p:cSld>
+    <p:spTree>
+      <p:nvGrpSpPr>
+        <p:cNvPr id="1" name=""/>
+        <p:cNvGrpSpPr/>
+        <p:nvPr/>
+      </p:nvGrpSpPr>
+      <p:grpSpPr>
+        <a:xfrm>
+          <a:off x="0" y="0"/>
+          <a:ext cx="0" cy="0"/>
+          <a:chOff x="0" y="0"/>
+          <a:chExt cx="0" cy="0"/>
+        </a:xfrm>
+      </p:grpSpPr>
+      <p:sp>
+        <p:nvSpPr>
+          <p:cNvPr id="2" name="Title 1">
+            <a:extLst>
+              <a:ext uri="{FF2B5EF4-FFF2-40B4-BE49-F238E27FC236}">
                 <a16:creationId xmlns:a16="http://schemas.microsoft.com/office/drawing/2014/main" id="{C4FFE90E-2FEC-4CDA-8627-D60D1EB16879}"/>
               </a:ext>
             </a:extLst>
@@ -8119,7 +8891,7 @@
 </p:sld>
 </file>
 
-<file path=ppt/slides/slide5.xml><?xml version="1.0" encoding="utf-8"?>
+<file path=ppt/slides/slide6.xml><?xml version="1.0" encoding="utf-8"?>
 <p:sld xmlns:a="http://schemas.openxmlformats.org/drawingml/2006/main" xmlns:r="http://schemas.openxmlformats.org/officeDocument/2006/relationships" xmlns:p="http://schemas.openxmlformats.org/presentationml/2006/main">
   <p:cSld>
     <p:spTree>
@@ -8209,7 +8981,7 @@
 </p:sld>
 </file>
 
-<file path=ppt/slides/slide6.xml><?xml version="1.0" encoding="utf-8"?>
+<file path=ppt/slides/slide7.xml><?xml version="1.0" encoding="utf-8"?>
 <p:sld xmlns:a="http://schemas.openxmlformats.org/drawingml/2006/main" xmlns:r="http://schemas.openxmlformats.org/officeDocument/2006/relationships" xmlns:p="http://schemas.openxmlformats.org/presentationml/2006/main">
   <p:cSld>
     <p:spTree>
@@ -8344,7 +9116,7 @@
 </p:sld>
 </file>
 
-<file path=ppt/slides/slide7.xml><?xml version="1.0" encoding="utf-8"?>
+<file path=ppt/slides/slide8.xml><?xml version="1.0" encoding="utf-8"?>
 <p:sld xmlns:a="http://schemas.openxmlformats.org/drawingml/2006/main" xmlns:r="http://schemas.openxmlformats.org/officeDocument/2006/relationships" xmlns:p="http://schemas.openxmlformats.org/presentationml/2006/main">
   <p:cSld>
     <p:spTree>
@@ -8431,7 +9203,7 @@
 </p:sld>
 </file>
 
-<file path=ppt/slides/slide8.xml><?xml version="1.0" encoding="utf-8"?>
+<file path=ppt/slides/slide9.xml><?xml version="1.0" encoding="utf-8"?>
 <p:sld xmlns:a="http://schemas.openxmlformats.org/drawingml/2006/main" xmlns:r="http://schemas.openxmlformats.org/officeDocument/2006/relationships" xmlns:p="http://schemas.openxmlformats.org/presentationml/2006/main">
   <p:cSld>
     <p:spTree>
@@ -8563,142 +9335,6 @@
     <p:extLst>
       <p:ext uri="{BB962C8B-B14F-4D97-AF65-F5344CB8AC3E}">
         <p14:creationId xmlns:p14="http://schemas.microsoft.com/office/powerpoint/2010/main" val="3516567930"/>
-      </p:ext>
-    </p:extLst>
-  </p:cSld>
-  <p:clrMapOvr>
-    <a:masterClrMapping/>
-  </p:clrMapOvr>
-</p:sld>
-</file>
-
-<file path=ppt/slides/slide9.xml><?xml version="1.0" encoding="utf-8"?>
-<p:sld xmlns:a="http://schemas.openxmlformats.org/drawingml/2006/main" xmlns:r="http://schemas.openxmlformats.org/officeDocument/2006/relationships" xmlns:p="http://schemas.openxmlformats.org/presentationml/2006/main">
-  <p:cSld>
-    <p:spTree>
-      <p:nvGrpSpPr>
-        <p:cNvPr id="1" name=""/>
-        <p:cNvGrpSpPr/>
-        <p:nvPr/>
-      </p:nvGrpSpPr>
-      <p:grpSpPr>
-        <a:xfrm>
-          <a:off x="0" y="0"/>
-          <a:ext cx="0" cy="0"/>
-          <a:chOff x="0" y="0"/>
-          <a:chExt cx="0" cy="0"/>
-        </a:xfrm>
-      </p:grpSpPr>
-      <p:sp>
-        <p:nvSpPr>
-          <p:cNvPr id="2" name="Title 1">
-            <a:extLst>
-              <a:ext uri="{FF2B5EF4-FFF2-40B4-BE49-F238E27FC236}">
-                <a16:creationId xmlns:a16="http://schemas.microsoft.com/office/drawing/2014/main" id="{CCB4DBD1-1605-4CBA-8FC9-F137AE66C24E}"/>
-              </a:ext>
-            </a:extLst>
-          </p:cNvPr>
-          <p:cNvSpPr>
-            <a:spLocks noGrp="1"/>
-          </p:cNvSpPr>
-          <p:nvPr>
-            <p:ph type="title"/>
-          </p:nvPr>
-        </p:nvSpPr>
-        <p:spPr/>
-        <p:txBody>
-          <a:bodyPr/>
-          <a:lstStyle/>
-          <a:p>
-            <a:r>
-              <a:rPr lang="en-US" dirty="0"/>
-              <a:t>Box Plot</a:t>
-            </a:r>
-          </a:p>
-        </p:txBody>
-      </p:sp>
-      <p:sp>
-        <p:nvSpPr>
-          <p:cNvPr id="3" name="Content Placeholder 2">
-            <a:extLst>
-              <a:ext uri="{FF2B5EF4-FFF2-40B4-BE49-F238E27FC236}">
-                <a16:creationId xmlns:a16="http://schemas.microsoft.com/office/drawing/2014/main" id="{325EA30B-0266-4DBB-B77A-7B1946D4EDB7}"/>
-              </a:ext>
-            </a:extLst>
-          </p:cNvPr>
-          <p:cNvSpPr>
-            <a:spLocks noGrp="1"/>
-          </p:cNvSpPr>
-          <p:nvPr>
-            <p:ph sz="half" idx="1"/>
-          </p:nvPr>
-        </p:nvSpPr>
-        <p:spPr/>
-        <p:txBody>
-          <a:bodyPr/>
-          <a:lstStyle/>
-          <a:p>
-            <a:r>
-              <a:rPr lang="en-US" dirty="0"/>
-              <a:t>Is useful for those who want to know the maximum value and minimum value.</a:t>
-            </a:r>
-          </a:p>
-          <a:p>
-            <a:r>
-              <a:rPr lang="en-US" dirty="0"/>
-              <a:t>Also it shows the quartile and it’s values </a:t>
-            </a:r>
-          </a:p>
-          <a:p>
-            <a:r>
-              <a:rPr lang="en-US" dirty="0"/>
-              <a:t>Show the outliers, use it for data wrangling.</a:t>
-            </a:r>
-          </a:p>
-          <a:p>
-            <a:r>
-              <a:rPr lang="en-US" dirty="0"/>
-              <a:t>Shows mean and median, standard deviation.</a:t>
-            </a:r>
-          </a:p>
-          <a:p>
-            <a:endParaRPr lang="en-US" dirty="0"/>
-          </a:p>
-        </p:txBody>
-      </p:sp>
-      <p:pic>
-        <p:nvPicPr>
-          <p:cNvPr id="6" name="Content Placeholder 5">
-            <a:extLst>
-              <a:ext uri="{FF2B5EF4-FFF2-40B4-BE49-F238E27FC236}">
-                <a16:creationId xmlns:a16="http://schemas.microsoft.com/office/drawing/2014/main" id="{AE635328-1FB0-4A91-8954-958A9EF4F4ED}"/>
-              </a:ext>
-            </a:extLst>
-          </p:cNvPr>
-          <p:cNvPicPr>
-            <a:picLocks noGrp="1" noChangeAspect="1"/>
-          </p:cNvPicPr>
-          <p:nvPr>
-            <p:ph sz="half" idx="2"/>
-          </p:nvPr>
-        </p:nvPicPr>
-        <p:blipFill>
-          <a:blip r:embed="rId2"/>
-          <a:stretch>
-            <a:fillRect/>
-          </a:stretch>
-        </p:blipFill>
-        <p:spPr>
-          <a:xfrm>
-            <a:off x="6461125" y="2213505"/>
-            <a:ext cx="4664075" cy="3527953"/>
-          </a:xfrm>
-        </p:spPr>
-      </p:pic>
-    </p:spTree>
-    <p:extLst>
-      <p:ext uri="{BB962C8B-B14F-4D97-AF65-F5344CB8AC3E}">
-        <p14:creationId xmlns:p14="http://schemas.microsoft.com/office/powerpoint/2010/main" val="922199565"/>
       </p:ext>
     </p:extLst>
   </p:cSld>
@@ -9071,15 +9707,6 @@
 </file>
 
 <file path=customXml/item1.xml><?xml version="1.0" encoding="utf-8"?>
-<?mso-contentType ?>
-<FormTemplates xmlns="http://schemas.microsoft.com/sharepoint/v3/contenttype/forms">
-  <Display>DocumentLibraryForm</Display>
-  <Edit>DocumentLibraryForm</Edit>
-  <New>DocumentLibraryForm</New>
-</FormTemplates>
-</file>
-
-<file path=customXml/item2.xml><?xml version="1.0" encoding="utf-8"?>
 <p:properties xmlns:p="http://schemas.microsoft.com/office/2006/metadata/properties" xmlns:xsi="http://www.w3.org/2001/XMLSchema-instance" xmlns:pc="http://schemas.microsoft.com/office/infopath/2007/PartnerControls">
   <documentManagement>
     <Status xmlns="71af3243-3dd4-4a8d-8c0d-dd76da1f02a5">Not started</Status>
@@ -9088,7 +9715,7 @@
 </p:properties>
 </file>
 
-<file path=customXml/item3.xml><?xml version="1.0" encoding="utf-8"?>
+<file path=customXml/item2.xml><?xml version="1.0" encoding="utf-8"?>
 <ct:contentTypeSchema xmlns:ct="http://schemas.microsoft.com/office/2006/metadata/contentType" xmlns:ma="http://schemas.microsoft.com/office/2006/metadata/properties/metaAttributes" ct:_="" ma:_="" ma:contentTypeName="Document" ma:contentTypeID="0x01010079F111ED35F8CC479449609E8A0923A6" ma:contentTypeVersion="12" ma:contentTypeDescription="Create a new document." ma:contentTypeScope="" ma:versionID="a410dd7f93c95333ffa1b60ed6adedd1">
   <xsd:schema xmlns:xsd="http://www.w3.org/2001/XMLSchema" xmlns:xs="http://www.w3.org/2001/XMLSchema" xmlns:p="http://schemas.microsoft.com/office/2006/metadata/properties" xmlns:ns2="71af3243-3dd4-4a8d-8c0d-dd76da1f02a5" xmlns:ns3="16c05727-aa75-4e4a-9b5f-8a80a1165891" targetNamespace="http://schemas.microsoft.com/office/2006/metadata/properties" ma:root="true" ma:fieldsID="a936d9baba76aa3866493feff160faab" ns2:_="" ns3:_="">
     <xsd:import namespace="71af3243-3dd4-4a8d-8c0d-dd76da1f02a5"/>
@@ -9309,15 +9936,16 @@
 </ct:contentTypeSchema>
 </file>
 
-<file path=customXml/itemProps1.xml><?xml version="1.0" encoding="utf-8"?>
-<ds:datastoreItem xmlns:ds="http://schemas.openxmlformats.org/officeDocument/2006/customXml" ds:itemID="{AE2713E1-6312-427E-BFCB-C5A5DA301373}">
-  <ds:schemaRefs>
-    <ds:schemaRef ds:uri="http://schemas.microsoft.com/sharepoint/v3/contenttype/forms"/>
-  </ds:schemaRefs>
-</ds:datastoreItem>
+<file path=customXml/item3.xml><?xml version="1.0" encoding="utf-8"?>
+<?mso-contentType ?>
+<FormTemplates xmlns="http://schemas.microsoft.com/sharepoint/v3/contenttype/forms">
+  <Display>DocumentLibraryForm</Display>
+  <Edit>DocumentLibraryForm</Edit>
+  <New>DocumentLibraryForm</New>
+</FormTemplates>
 </file>
 
-<file path=customXml/itemProps2.xml><?xml version="1.0" encoding="utf-8"?>
+<file path=customXml/itemProps1.xml><?xml version="1.0" encoding="utf-8"?>
 <ds:datastoreItem xmlns:ds="http://schemas.openxmlformats.org/officeDocument/2006/customXml" ds:itemID="{52F3B215-496E-4790-A364-7C1C46DEC771}">
   <ds:schemaRefs>
     <ds:schemaRef ds:uri="http://schemas.microsoft.com/office/2006/metadata/properties"/>
@@ -9327,7 +9955,7 @@
 </ds:datastoreItem>
 </file>
 
-<file path=customXml/itemProps3.xml><?xml version="1.0" encoding="utf-8"?>
+<file path=customXml/itemProps2.xml><?xml version="1.0" encoding="utf-8"?>
 <ds:datastoreItem xmlns:ds="http://schemas.openxmlformats.org/officeDocument/2006/customXml" ds:itemID="{50DB95DD-0319-4EE5-8C5C-9CEDF75E024B}">
   <ds:schemaRefs>
     <ds:schemaRef ds:uri="http://schemas.microsoft.com/office/2006/metadata/contentType"/>
@@ -9344,4 +9972,12 @@
     <ds:schemaRef ds:uri="http://schemas.microsoft.com/internal/obd"/>
   </ds:schemaRefs>
 </ds:datastoreItem>
+</file>
+
+<file path=customXml/itemProps3.xml><?xml version="1.0" encoding="utf-8"?>
+<ds:datastoreItem xmlns:ds="http://schemas.openxmlformats.org/officeDocument/2006/customXml" ds:itemID="{AE2713E1-6312-427E-BFCB-C5A5DA301373}">
+  <ds:schemaRefs>
+    <ds:schemaRef ds:uri="http://schemas.microsoft.com/sharepoint/v3/contenttype/forms"/>
+  </ds:schemaRefs>
+</ds:datastoreItem>
 </file>
</xml_diff>

<commit_message>
adding three boxes plots
</commit_message>
<xml_diff>
--- a/Project.pptx
+++ b/Project.pptx
@@ -7206,7 +7206,7 @@
         <p:spPr/>
         <p:txBody>
           <a:bodyPr>
-            <a:normAutofit fontScale="92500" lnSpcReduction="20000"/>
+            <a:normAutofit fontScale="85000" lnSpcReduction="10000"/>
           </a:bodyPr>
           <a:lstStyle/>
           <a:p>
@@ -7246,7 +7246,7 @@
           <a:p>
             <a:r>
               <a:rPr lang="en-US" dirty="0"/>
-              <a:t>y-axis is these values.</a:t>
+              <a:t>Also there are difference between right and left and normal skewed</a:t>
             </a:r>
           </a:p>
           <a:p>
@@ -7256,10 +7256,10 @@
       </p:sp>
       <p:pic>
         <p:nvPicPr>
-          <p:cNvPr id="6" name="Content Placeholder 5">
+          <p:cNvPr id="8" name="Content Placeholder 7">
             <a:extLst>
               <a:ext uri="{FF2B5EF4-FFF2-40B4-BE49-F238E27FC236}">
-                <a16:creationId xmlns:a16="http://schemas.microsoft.com/office/drawing/2014/main" id="{AE635328-1FB0-4A91-8954-958A9EF4F4ED}"/>
+                <a16:creationId xmlns:a16="http://schemas.microsoft.com/office/drawing/2014/main" id="{8A913DC9-850B-4527-BE8B-7A0FA8D5664C}"/>
               </a:ext>
             </a:extLst>
           </p:cNvPr>
@@ -7278,8 +7278,8 @@
         </p:blipFill>
         <p:spPr>
           <a:xfrm>
-            <a:off x="6461125" y="2213505"/>
-            <a:ext cx="4664075" cy="3527953"/>
+            <a:off x="6461125" y="2204962"/>
+            <a:ext cx="4664075" cy="3545039"/>
           </a:xfrm>
         </p:spPr>
       </p:pic>
@@ -7771,8 +7771,8 @@
           </a:p>
         </p:txBody>
       </p:sp>
-      <mc:AlternateContent xmlns:mc="http://schemas.openxmlformats.org/markup-compatibility/2006">
-        <mc:Choice xmlns:a14="http://schemas.microsoft.com/office/drawing/2010/main" Requires="a14">
+      <mc:AlternateContent xmlns:mc="http://schemas.openxmlformats.org/markup-compatibility/2006" xmlns:a14="http://schemas.microsoft.com/office/drawing/2010/main">
+        <mc:Choice Requires="a14">
           <p:sp>
             <p:nvSpPr>
               <p:cNvPr id="3" name="Content Placeholder 2">
@@ -8392,7 +8392,7 @@
             </p:txBody>
           </p:sp>
         </mc:Choice>
-        <mc:Fallback>
+        <mc:Fallback xmlns="">
           <p:sp>
             <p:nvSpPr>
               <p:cNvPr id="3" name="Content Placeholder 2">
@@ -8490,8 +8490,8 @@
           </a:p>
         </p:txBody>
       </p:sp>
-      <mc:AlternateContent xmlns:mc="http://schemas.openxmlformats.org/markup-compatibility/2006">
-        <mc:Choice xmlns:a14="http://schemas.microsoft.com/office/drawing/2010/main" Requires="a14">
+      <mc:AlternateContent xmlns:mc="http://schemas.openxmlformats.org/markup-compatibility/2006" xmlns:a14="http://schemas.microsoft.com/office/drawing/2010/main">
+        <mc:Choice Requires="a14">
           <p:sp>
             <p:nvSpPr>
               <p:cNvPr id="3" name="Content Placeholder 2">
@@ -8753,13 +8753,7 @@
                       <a:rPr lang="en-US" sz="2000" b="0" i="1" smtClean="0">
                         <a:latin typeface="Cambria Math" panose="02040503050406030204" pitchFamily="18" charset="0"/>
                       </a:rPr>
-                      <m:t>−</m:t>
-                    </m:r>
-                    <m:r>
-                      <a:rPr lang="en-US" sz="2000" b="0" i="1" smtClean="0">
-                        <a:latin typeface="Cambria Math" panose="02040503050406030204" pitchFamily="18" charset="0"/>
-                      </a:rPr>
-                      <m:t>1</m:t>
+                      <m:t>−1</m:t>
                     </m:r>
                   </m:oMath>
                 </a14:m>
@@ -8839,7 +8833,7 @@
             </p:txBody>
           </p:sp>
         </mc:Choice>
-        <mc:Fallback>
+        <mc:Fallback xmlns="">
           <p:sp>
             <p:nvSpPr>
               <p:cNvPr id="3" name="Content Placeholder 2">
@@ -8879,8 +8873,8 @@
           </p:sp>
         </mc:Fallback>
       </mc:AlternateContent>
-      <mc:AlternateContent xmlns:mc="http://schemas.openxmlformats.org/markup-compatibility/2006">
-        <mc:Choice xmlns:a14="http://schemas.microsoft.com/office/drawing/2010/main" Requires="a14">
+      <mc:AlternateContent xmlns:mc="http://schemas.openxmlformats.org/markup-compatibility/2006" xmlns:a14="http://schemas.microsoft.com/office/drawing/2010/main">
+        <mc:Choice Requires="a14">
           <p:sp>
             <p:nvSpPr>
               <p:cNvPr id="4" name="Content Placeholder 3">
@@ -9008,19 +9002,7 @@
                           <a:rPr lang="en-US" b="0" i="1" smtClean="0">
                             <a:latin typeface="Cambria Math" panose="02040503050406030204" pitchFamily="18" charset="0"/>
                           </a:rPr>
-                          <m:t>−</m:t>
-                        </m:r>
-                        <m:r>
-                          <a:rPr lang="en-US" b="0" i="1" smtClean="0">
-                            <a:latin typeface="Cambria Math" panose="02040503050406030204" pitchFamily="18" charset="0"/>
-                          </a:rPr>
-                          <m:t>1</m:t>
-                        </m:r>
-                        <m:r>
-                          <a:rPr lang="en-US" b="0" i="1" smtClean="0">
-                            <a:latin typeface="Cambria Math" panose="02040503050406030204" pitchFamily="18" charset="0"/>
-                          </a:rPr>
-                          <m:t>)</m:t>
+                          <m:t>−1)</m:t>
                         </m:r>
                       </m:e>
                     </m:nary>
@@ -9034,7 +9016,7 @@
             </p:txBody>
           </p:sp>
         </mc:Choice>
-        <mc:Fallback>
+        <mc:Fallback xmlns="">
           <p:sp>
             <p:nvSpPr>
               <p:cNvPr id="4" name="Content Placeholder 3">
@@ -9162,8 +9144,8 @@
           </a:p>
         </p:txBody>
       </p:sp>
-      <mc:AlternateContent xmlns:mc="http://schemas.openxmlformats.org/markup-compatibility/2006">
-        <mc:Choice xmlns:a14="http://schemas.microsoft.com/office/drawing/2010/main" Requires="a14">
+      <mc:AlternateContent xmlns:mc="http://schemas.openxmlformats.org/markup-compatibility/2006" xmlns:a14="http://schemas.microsoft.com/office/drawing/2010/main">
+        <mc:Choice Requires="a14">
           <p:sp>
             <p:nvSpPr>
               <p:cNvPr id="5" name="Content Placeholder 4">
@@ -9385,7 +9367,7 @@
             </p:txBody>
           </p:sp>
         </mc:Choice>
-        <mc:Fallback>
+        <mc:Fallback xmlns="">
           <p:sp>
             <p:nvSpPr>
               <p:cNvPr id="5" name="Content Placeholder 4">
@@ -9483,8 +9465,8 @@
           </a:p>
         </p:txBody>
       </p:sp>
-      <mc:AlternateContent xmlns:mc="http://schemas.openxmlformats.org/markup-compatibility/2006">
-        <mc:Choice xmlns:a14="http://schemas.microsoft.com/office/drawing/2010/main" Requires="a14">
+      <mc:AlternateContent xmlns:mc="http://schemas.openxmlformats.org/markup-compatibility/2006" xmlns:a14="http://schemas.microsoft.com/office/drawing/2010/main">
+        <mc:Choice Requires="a14">
           <p:sp>
             <p:nvSpPr>
               <p:cNvPr id="4" name="Content Placeholder 3">
@@ -9668,31 +9650,7 @@
                             <a:rPr lang="en-US" b="0" i="1" smtClean="0">
                               <a:latin typeface="Cambria Math" panose="02040503050406030204" pitchFamily="18" charset="0"/>
                             </a:rPr>
-                            <m:t>805</m:t>
-                          </m:r>
-                          <m:r>
-                            <a:rPr lang="en-US" b="0" i="1" smtClean="0">
-                              <a:latin typeface="Cambria Math" panose="02040503050406030204" pitchFamily="18" charset="0"/>
-                            </a:rPr>
-                            <m:t>+</m:t>
-                          </m:r>
-                          <m:r>
-                            <a:rPr lang="en-US" b="0" i="1" smtClean="0">
-                              <a:latin typeface="Cambria Math" panose="02040503050406030204" pitchFamily="18" charset="0"/>
-                            </a:rPr>
-                            <m:t>785</m:t>
-                          </m:r>
-                          <m:r>
-                            <a:rPr lang="en-US" b="0" i="1" smtClean="0">
-                              <a:latin typeface="Cambria Math" panose="02040503050406030204" pitchFamily="18" charset="0"/>
-                            </a:rPr>
-                            <m:t>+</m:t>
-                          </m:r>
-                          <m:r>
-                            <a:rPr lang="en-US" b="0" i="1" smtClean="0">
-                              <a:latin typeface="Cambria Math" panose="02040503050406030204" pitchFamily="18" charset="0"/>
-                            </a:rPr>
-                            <m:t>905</m:t>
+                            <m:t>805+785+905</m:t>
                           </m:r>
                         </m:num>
                         <m:den>
@@ -9708,25 +9666,7 @@
                         <a:rPr lang="en-US" b="0" i="1" smtClean="0">
                           <a:latin typeface="Cambria Math" panose="02040503050406030204" pitchFamily="18" charset="0"/>
                         </a:rPr>
-                        <m:t>=</m:t>
-                      </m:r>
-                      <m:r>
-                        <a:rPr lang="en-US" b="0" i="1" smtClean="0">
-                          <a:latin typeface="Cambria Math" panose="02040503050406030204" pitchFamily="18" charset="0"/>
-                        </a:rPr>
-                        <m:t>84</m:t>
-                      </m:r>
-                      <m:r>
-                        <a:rPr lang="en-US" b="0" i="1" smtClean="0">
-                          <a:latin typeface="Cambria Math" panose="02040503050406030204" pitchFamily="18" charset="0"/>
-                        </a:rPr>
-                        <m:t>.</m:t>
-                      </m:r>
-                      <m:r>
-                        <a:rPr lang="en-US" b="0" i="1" smtClean="0">
-                          <a:latin typeface="Cambria Math" panose="02040503050406030204" pitchFamily="18" charset="0"/>
-                        </a:rPr>
-                        <m:t>67</m:t>
+                        <m:t>=84.67</m:t>
                       </m:r>
                     </m:oMath>
                   </m:oMathPara>
@@ -9754,14 +9694,7 @@
                             <m:nor/>
                           </m:rPr>
                           <a:rPr lang="en-US" dirty="0"/>
-                          <m:t>85-84.67</m:t>
-                        </m:r>
-                        <m:r>
-                          <m:rPr>
-                            <m:nor/>
-                          </m:rPr>
-                          <a:rPr lang="en-US" dirty="0"/>
-                          <m:t>)</m:t>
+                          <m:t>85−84.67)</m:t>
                         </m:r>
                       </m:e>
                       <m:sup>
@@ -9777,19 +9710,7 @@
                       <a:rPr lang="en-US" b="0" i="1" smtClean="0">
                         <a:latin typeface="Cambria Math" panose="02040503050406030204" pitchFamily="18" charset="0"/>
                       </a:rPr>
-                      <m:t>+</m:t>
-                    </m:r>
-                    <m:r>
-                      <a:rPr lang="en-US" b="0" i="1" smtClean="0">
-                        <a:latin typeface="Cambria Math" panose="02040503050406030204" pitchFamily="18" charset="0"/>
-                      </a:rPr>
-                      <m:t>10</m:t>
-                    </m:r>
-                    <m:r>
-                      <a:rPr lang="en-US" b="0" i="1" smtClean="0">
-                        <a:latin typeface="Cambria Math" panose="02040503050406030204" pitchFamily="18" charset="0"/>
-                      </a:rPr>
-                      <m:t>∗(</m:t>
+                      <m:t>+10∗(</m:t>
                     </m:r>
                     <m:sSup>
                       <m:sSupPr>
@@ -9814,21 +9735,7 @@
                             <m:nor/>
                           </m:rPr>
                           <a:rPr lang="en-US" dirty="0"/>
-                          <m:t>−</m:t>
-                        </m:r>
-                        <m:r>
-                          <m:rPr>
-                            <m:nor/>
-                          </m:rPr>
-                          <a:rPr lang="en-US" dirty="0"/>
-                          <m:t>84.67</m:t>
-                        </m:r>
-                        <m:r>
-                          <m:rPr>
-                            <m:nor/>
-                          </m:rPr>
-                          <a:rPr lang="en-US" dirty="0"/>
-                          <m:t>)</m:t>
+                          <m:t>−84.67)</m:t>
                         </m:r>
                       </m:e>
                       <m:sup>
@@ -9871,21 +9778,7 @@
                             <m:nor/>
                           </m:rPr>
                           <a:rPr lang="en-US" dirty="0"/>
-                          <m:t>−</m:t>
-                        </m:r>
-                        <m:r>
-                          <m:rPr>
-                            <m:nor/>
-                          </m:rPr>
-                          <a:rPr lang="en-US" dirty="0"/>
-                          <m:t>84.67</m:t>
-                        </m:r>
-                        <m:r>
-                          <m:rPr>
-                            <m:nor/>
-                          </m:rPr>
-                          <a:rPr lang="en-US" dirty="0"/>
-                          <m:t>)</m:t>
+                          <m:t>−84.67)</m:t>
                         </m:r>
                       </m:e>
                       <m:sup>
@@ -10016,7 +9909,7 @@
             </p:txBody>
           </p:sp>
         </mc:Choice>
-        <mc:Fallback>
+        <mc:Fallback xmlns="">
           <p:sp>
             <p:nvSpPr>
               <p:cNvPr id="4" name="Content Placeholder 3">
@@ -10056,8 +9949,8 @@
           </p:sp>
         </mc:Fallback>
       </mc:AlternateContent>
-      <mc:AlternateContent xmlns:mc="http://schemas.openxmlformats.org/markup-compatibility/2006">
-        <mc:Choice xmlns:a14="http://schemas.microsoft.com/office/drawing/2010/main" Requires="a14">
+      <mc:AlternateContent xmlns:mc="http://schemas.openxmlformats.org/markup-compatibility/2006" xmlns:a14="http://schemas.microsoft.com/office/drawing/2010/main">
+        <mc:Choice Requires="a14">
           <p:graphicFrame>
             <p:nvGraphicFramePr>
               <p:cNvPr id="6" name="Table 6">
@@ -10686,13 +10579,7 @@
                                   <a:rPr lang="en-US" b="0" i="1" smtClean="0">
                                     <a:latin typeface="Cambria Math" panose="02040503050406030204" pitchFamily="18" charset="0"/>
                                   </a:rPr>
-                                  <m:t>=</m:t>
-                                </m:r>
-                                <m:r>
-                                  <a:rPr lang="en-US" b="0" i="1" smtClean="0">
-                                    <a:latin typeface="Cambria Math" panose="02040503050406030204" pitchFamily="18" charset="0"/>
-                                  </a:rPr>
-                                  <m:t>85</m:t>
+                                  <m:t>=85</m:t>
                                 </m:r>
                               </m:oMath>
                             </m:oMathPara>
@@ -10736,25 +10623,7 @@
                                   <a:rPr lang="en-US" b="0" i="1" smtClean="0">
                                     <a:latin typeface="Cambria Math" panose="02040503050406030204" pitchFamily="18" charset="0"/>
                                   </a:rPr>
-                                  <m:t>=</m:t>
-                                </m:r>
-                                <m:r>
-                                  <a:rPr lang="en-US" b="0" i="1" smtClean="0">
-                                    <a:latin typeface="Cambria Math" panose="02040503050406030204" pitchFamily="18" charset="0"/>
-                                  </a:rPr>
-                                  <m:t>78</m:t>
-                                </m:r>
-                                <m:r>
-                                  <a:rPr lang="en-US" b="0" i="1" smtClean="0">
-                                    <a:latin typeface="Cambria Math" panose="02040503050406030204" pitchFamily="18" charset="0"/>
-                                  </a:rPr>
-                                  <m:t>.</m:t>
-                                </m:r>
-                                <m:r>
-                                  <a:rPr lang="en-US" b="0" i="1" smtClean="0">
-                                    <a:latin typeface="Cambria Math" panose="02040503050406030204" pitchFamily="18" charset="0"/>
-                                  </a:rPr>
-                                  <m:t>5</m:t>
+                                  <m:t>=78.5</m:t>
                                 </m:r>
                               </m:oMath>
                             </m:oMathPara>
@@ -10798,25 +10667,7 @@
                                   <a:rPr lang="en-US" b="0" i="1" smtClean="0">
                                     <a:latin typeface="Cambria Math" panose="02040503050406030204" pitchFamily="18" charset="0"/>
                                   </a:rPr>
-                                  <m:t>=</m:t>
-                                </m:r>
-                                <m:r>
-                                  <a:rPr lang="en-US" b="0" i="1" smtClean="0">
-                                    <a:latin typeface="Cambria Math" panose="02040503050406030204" pitchFamily="18" charset="0"/>
-                                  </a:rPr>
-                                  <m:t>90</m:t>
-                                </m:r>
-                                <m:r>
-                                  <a:rPr lang="en-US" b="0" i="1" smtClean="0">
-                                    <a:latin typeface="Cambria Math" panose="02040503050406030204" pitchFamily="18" charset="0"/>
-                                  </a:rPr>
-                                  <m:t>.</m:t>
-                                </m:r>
-                                <m:r>
-                                  <a:rPr lang="en-US" b="0" i="1" smtClean="0">
-                                    <a:latin typeface="Cambria Math" panose="02040503050406030204" pitchFamily="18" charset="0"/>
-                                  </a:rPr>
-                                  <m:t>5</m:t>
+                                  <m:t>=90.5</m:t>
                                 </m:r>
                               </m:oMath>
                             </m:oMathPara>
@@ -10837,7 +10688,7 @@
             </a:graphic>
           </p:graphicFrame>
         </mc:Choice>
-        <mc:Fallback>
+        <mc:Fallback xmlns="">
           <p:graphicFrame>
             <p:nvGraphicFramePr>
               <p:cNvPr id="6" name="Table 6">
@@ -11553,8 +11404,8 @@
           </a:p>
         </p:txBody>
       </p:sp>
-      <mc:AlternateContent xmlns:mc="http://schemas.openxmlformats.org/markup-compatibility/2006">
-        <mc:Choice xmlns:a14="http://schemas.microsoft.com/office/drawing/2010/main" Requires="a14">
+      <mc:AlternateContent xmlns:mc="http://schemas.openxmlformats.org/markup-compatibility/2006" xmlns:a14="http://schemas.microsoft.com/office/drawing/2010/main">
+        <mc:Choice Requires="a14">
           <p:sp>
             <p:nvSpPr>
               <p:cNvPr id="3" name="Content Placeholder 2">
@@ -11824,7 +11675,7 @@
             </p:txBody>
           </p:sp>
         </mc:Choice>
-        <mc:Fallback>
+        <mc:Fallback xmlns="">
           <p:sp>
             <p:nvSpPr>
               <p:cNvPr id="3" name="Content Placeholder 2">

</xml_diff>